<commit_message>
corrections to a couple of slides
</commit_message>
<xml_diff>
--- a/PowerPoints/11 - Code Generation.pptx
+++ b/PowerPoints/11 - Code Generation.pptx
@@ -70,7 +70,7 @@
     <p:sldId id="306" r:id="rId58"/>
   </p:sldIdLst>
   <p:sldSz cx="9144000" cy="6858000" type="screen4x3"/>
-  <p:notesSz cx="7010400" cy="9296400"/>
+  <p:notesSz cx="7315200" cy="9601200"/>
   <p:defaultTextStyle>
     <a:defPPr>
       <a:defRPr lang="en-US"/>
@@ -213,12 +213,12 @@
     </p:ext>
     <p:ext uri="{2D200454-40CA-4A62-9FC3-DE9A4176ACB9}">
       <p15:notesGuideLst xmlns:p15="http://schemas.microsoft.com/office/powerpoint/2012/main">
-        <p15:guide id="1" orient="horz" pos="2928" userDrawn="1">
+        <p15:guide id="1" orient="horz" pos="3024" userDrawn="1">
           <p15:clr>
             <a:srgbClr val="A4A3A4"/>
           </p15:clr>
         </p15:guide>
-        <p15:guide id="2" pos="2208" userDrawn="1">
+        <p15:guide id="2" pos="2304" userDrawn="1">
           <p15:clr>
             <a:srgbClr val="A4A3A4"/>
           </p15:clr>
@@ -266,8 +266,8 @@
         </p:nvSpPr>
         <p:spPr bwMode="auto">
           <a:xfrm>
-            <a:off x="3971926" y="0"/>
-            <a:ext cx="3038475" cy="465138"/>
+            <a:off x="4144619" y="0"/>
+            <a:ext cx="3170583" cy="480388"/>
           </a:xfrm>
           <a:prstGeom prst="rect">
             <a:avLst/>
@@ -282,13 +282,13 @@
           <a:effectLst/>
         </p:spPr>
         <p:txBody>
-          <a:bodyPr vert="horz" wrap="square" lIns="93164" tIns="46582" rIns="93164" bIns="46582" numCol="1" anchor="t" anchorCtr="0" compatLnSpc="1">
+          <a:bodyPr vert="horz" wrap="square" lIns="96639" tIns="48320" rIns="96639" bIns="48320" numCol="1" anchor="t" anchorCtr="0" compatLnSpc="1">
             <a:prstTxWarp prst="textNoShape">
               <a:avLst/>
             </a:prstTxWarp>
           </a:bodyPr>
           <a:lstStyle>
-            <a:lvl1pPr algn="r" defTabSz="931726">
+            <a:lvl1pPr algn="r" defTabSz="966479">
               <a:defRPr sz="1200"/>
             </a:lvl1pPr>
           </a:lstStyle>
@@ -317,8 +317,8 @@
         </p:nvSpPr>
         <p:spPr bwMode="auto">
           <a:xfrm>
-            <a:off x="3971926" y="8831264"/>
-            <a:ext cx="3038475" cy="465137"/>
+            <a:off x="4144619" y="9120814"/>
+            <a:ext cx="3170583" cy="480387"/>
           </a:xfrm>
           <a:prstGeom prst="rect">
             <a:avLst/>
@@ -333,13 +333,13 @@
           <a:effectLst/>
         </p:spPr>
         <p:txBody>
-          <a:bodyPr vert="horz" wrap="square" lIns="93164" tIns="46582" rIns="93164" bIns="46582" numCol="1" anchor="b" anchorCtr="0" compatLnSpc="1">
+          <a:bodyPr vert="horz" wrap="square" lIns="96639" tIns="48320" rIns="96639" bIns="48320" numCol="1" anchor="b" anchorCtr="0" compatLnSpc="1">
             <a:prstTxWarp prst="textNoShape">
               <a:avLst/>
             </a:prstTxWarp>
           </a:bodyPr>
           <a:lstStyle>
-            <a:lvl1pPr algn="r" defTabSz="931726">
+            <a:lvl1pPr algn="r" defTabSz="966479">
               <a:defRPr sz="1200"/>
             </a:lvl1pPr>
           </a:lstStyle>
@@ -417,7 +417,7 @@
         <p:spPr bwMode="auto">
           <a:xfrm>
             <a:off x="1" y="0"/>
-            <a:ext cx="3038475" cy="465138"/>
+            <a:ext cx="3170583" cy="480388"/>
           </a:xfrm>
           <a:prstGeom prst="rect">
             <a:avLst/>
@@ -432,13 +432,13 @@
           <a:effectLst/>
         </p:spPr>
         <p:txBody>
-          <a:bodyPr vert="horz" wrap="square" lIns="93164" tIns="46582" rIns="93164" bIns="46582" numCol="1" anchor="t" anchorCtr="0" compatLnSpc="1">
+          <a:bodyPr vert="horz" wrap="square" lIns="96639" tIns="48320" rIns="96639" bIns="48320" numCol="1" anchor="t" anchorCtr="0" compatLnSpc="1">
             <a:prstTxWarp prst="textNoShape">
               <a:avLst/>
             </a:prstTxWarp>
           </a:bodyPr>
           <a:lstStyle>
-            <a:lvl1pPr algn="l" defTabSz="931726">
+            <a:lvl1pPr algn="l" defTabSz="966479">
               <a:defRPr sz="1200"/>
             </a:lvl1pPr>
           </a:lstStyle>
@@ -465,8 +465,8 @@
         </p:nvSpPr>
         <p:spPr bwMode="auto">
           <a:xfrm>
-            <a:off x="3971926" y="0"/>
-            <a:ext cx="3038475" cy="465138"/>
+            <a:off x="4144619" y="0"/>
+            <a:ext cx="3170583" cy="480388"/>
           </a:xfrm>
           <a:prstGeom prst="rect">
             <a:avLst/>
@@ -481,13 +481,13 @@
           <a:effectLst/>
         </p:spPr>
         <p:txBody>
-          <a:bodyPr vert="horz" wrap="square" lIns="93164" tIns="46582" rIns="93164" bIns="46582" numCol="1" anchor="t" anchorCtr="0" compatLnSpc="1">
+          <a:bodyPr vert="horz" wrap="square" lIns="96639" tIns="48320" rIns="96639" bIns="48320" numCol="1" anchor="t" anchorCtr="0" compatLnSpc="1">
             <a:prstTxWarp prst="textNoShape">
               <a:avLst/>
             </a:prstTxWarp>
           </a:bodyPr>
           <a:lstStyle>
-            <a:lvl1pPr algn="r" defTabSz="931726">
+            <a:lvl1pPr algn="r" defTabSz="966479">
               <a:defRPr sz="1200"/>
             </a:lvl1pPr>
           </a:lstStyle>
@@ -511,8 +511,8 @@
         </p:nvSpPr>
         <p:spPr bwMode="auto">
           <a:xfrm>
-            <a:off x="1181100" y="696913"/>
-            <a:ext cx="4648200" cy="3486150"/>
+            <a:off x="1257300" y="719138"/>
+            <a:ext cx="4800600" cy="3600450"/>
           </a:xfrm>
           <a:prstGeom prst="rect">
             <a:avLst/>
@@ -540,8 +540,8 @@
         </p:nvSpPr>
         <p:spPr bwMode="auto">
           <a:xfrm>
-            <a:off x="935039" y="4416426"/>
-            <a:ext cx="5140325" cy="4183063"/>
+            <a:off x="975694" y="4561227"/>
+            <a:ext cx="5363817" cy="4320213"/>
           </a:xfrm>
           <a:prstGeom prst="rect">
             <a:avLst/>
@@ -556,7 +556,7 @@
           <a:effectLst/>
         </p:spPr>
         <p:txBody>
-          <a:bodyPr vert="horz" wrap="square" lIns="93164" tIns="46582" rIns="93164" bIns="46582" numCol="1" anchor="t" anchorCtr="0" compatLnSpc="1">
+          <a:bodyPr vert="horz" wrap="square" lIns="96639" tIns="48320" rIns="96639" bIns="48320" numCol="1" anchor="t" anchorCtr="0" compatLnSpc="1">
             <a:prstTxWarp prst="textNoShape">
               <a:avLst/>
             </a:prstTxWarp>
@@ -611,8 +611,8 @@
         </p:nvSpPr>
         <p:spPr bwMode="auto">
           <a:xfrm>
-            <a:off x="1" y="8831264"/>
-            <a:ext cx="3038475" cy="465137"/>
+            <a:off x="1" y="9120814"/>
+            <a:ext cx="3170583" cy="480387"/>
           </a:xfrm>
           <a:prstGeom prst="rect">
             <a:avLst/>
@@ -627,13 +627,13 @@
           <a:effectLst/>
         </p:spPr>
         <p:txBody>
-          <a:bodyPr vert="horz" wrap="square" lIns="93164" tIns="46582" rIns="93164" bIns="46582" numCol="1" anchor="b" anchorCtr="0" compatLnSpc="1">
+          <a:bodyPr vert="horz" wrap="square" lIns="96639" tIns="48320" rIns="96639" bIns="48320" numCol="1" anchor="b" anchorCtr="0" compatLnSpc="1">
             <a:prstTxWarp prst="textNoShape">
               <a:avLst/>
             </a:prstTxWarp>
           </a:bodyPr>
           <a:lstStyle>
-            <a:lvl1pPr algn="l" defTabSz="931726">
+            <a:lvl1pPr algn="l" defTabSz="966479">
               <a:defRPr sz="1200"/>
             </a:lvl1pPr>
           </a:lstStyle>
@@ -657,8 +657,8 @@
         </p:nvSpPr>
         <p:spPr bwMode="auto">
           <a:xfrm>
-            <a:off x="3971926" y="8831264"/>
-            <a:ext cx="3038475" cy="465137"/>
+            <a:off x="4144619" y="9120814"/>
+            <a:ext cx="3170583" cy="480387"/>
           </a:xfrm>
           <a:prstGeom prst="rect">
             <a:avLst/>
@@ -673,13 +673,13 @@
           <a:effectLst/>
         </p:spPr>
         <p:txBody>
-          <a:bodyPr vert="horz" wrap="square" lIns="93164" tIns="46582" rIns="93164" bIns="46582" numCol="1" anchor="b" anchorCtr="0" compatLnSpc="1">
+          <a:bodyPr vert="horz" wrap="square" lIns="96639" tIns="48320" rIns="96639" bIns="48320" numCol="1" anchor="b" anchorCtr="0" compatLnSpc="1">
             <a:prstTxWarp prst="textNoShape">
               <a:avLst/>
             </a:prstTxWarp>
           </a:bodyPr>
           <a:lstStyle>
-            <a:lvl1pPr algn="r" defTabSz="931726">
+            <a:lvl1pPr algn="r" defTabSz="966479">
               <a:defRPr sz="1200"/>
             </a:lvl1pPr>
           </a:lstStyle>
@@ -12943,14 +12943,28 @@
                 <a:latin typeface="Consolas" pitchFamily="49" charset="0"/>
                 <a:cs typeface="Consolas" pitchFamily="49" charset="0"/>
               </a:rPr>
-              <a:t>    else if (type() == </a:t>
+              <a:t>    else if (type() </a:t>
             </a:r>
             <a:r>
               <a:rPr lang="en-US" sz="1800" dirty="0" err="1">
                 <a:latin typeface="Consolas" pitchFamily="49" charset="0"/>
                 <a:cs typeface="Consolas" pitchFamily="49" charset="0"/>
               </a:rPr>
-              <a:t>Type.String</a:t>
+              <a:t>instanceof</a:t>
+            </a:r>
+            <a:r>
+              <a:rPr lang="en-US" sz="1800" dirty="0">
+                <a:latin typeface="Consolas" pitchFamily="49" charset="0"/>
+                <a:cs typeface="Consolas" pitchFamily="49" charset="0"/>
+              </a:rPr>
+              <a:t> </a:t>
+            </a:r>
+            <a:r>
+              <a:rPr lang="en-US" sz="1800" dirty="0" err="1">
+                <a:latin typeface="Consolas" pitchFamily="49" charset="0"/>
+                <a:cs typeface="Consolas" pitchFamily="49" charset="0"/>
+              </a:rPr>
+              <a:t>StringType</a:t>
             </a:r>
             <a:r>
               <a:rPr lang="en-US" sz="1800" dirty="0">
@@ -13921,7 +13935,7 @@
           <a:p>
             <a:r>
               <a:rPr lang="en-US" dirty="0"/>
-              <a:t>A binary expression contains an operator and one operand, where the operand is an expression.</a:t>
+              <a:t>A unary expression contains an operator and one operand, where the operand is an expression.</a:t>
             </a:r>
           </a:p>
           <a:p>

</xml_diff>